<commit_message>
review and updates for next week
</commit_message>
<xml_diff>
--- a/administrative/slide_presentations/.hidden/day1_agenda.pptx
+++ b/administrative/slide_presentations/.hidden/day1_agenda.pptx
@@ -5,16 +5,17 @@
     <p:sldMasterId id="2147483659" r:id="rId1"/>
   </p:sldMasterIdLst>
   <p:notesMasterIdLst>
-    <p:notesMasterId r:id="rId9"/>
+    <p:notesMasterId r:id="rId10"/>
   </p:notesMasterIdLst>
   <p:sldIdLst>
     <p:sldId id="260" r:id="rId2"/>
     <p:sldId id="256" r:id="rId3"/>
-    <p:sldId id="264" r:id="rId4"/>
-    <p:sldId id="265" r:id="rId5"/>
-    <p:sldId id="266" r:id="rId6"/>
-    <p:sldId id="259" r:id="rId7"/>
-    <p:sldId id="263" r:id="rId8"/>
+    <p:sldId id="269" r:id="rId4"/>
+    <p:sldId id="259" r:id="rId5"/>
+    <p:sldId id="268" r:id="rId6"/>
+    <p:sldId id="265" r:id="rId7"/>
+    <p:sldId id="267" r:id="rId8"/>
+    <p:sldId id="266" r:id="rId9"/>
   </p:sldIdLst>
   <p:sldSz cx="9144000" cy="5143500" type="screen16x9"/>
   <p:notesSz cx="6858000" cy="9144000"/>
@@ -9191,7 +9192,7 @@
           <p:cNvPr id="2" name="Title 1">
             <a:extLst>
               <a:ext uri="{FF2B5EF4-FFF2-40B4-BE49-F238E27FC236}">
-                <a16:creationId xmlns:a16="http://schemas.microsoft.com/office/drawing/2014/main" id="{FFA2D83D-830D-1748-91CD-79EE49729B1F}"/>
+                <a16:creationId xmlns:a16="http://schemas.microsoft.com/office/drawing/2014/main" id="{79A6276F-55C4-4E4F-A49E-B45F0384CC32}"/>
               </a:ext>
             </a:extLst>
           </p:cNvPr>
@@ -9211,7 +9212,7 @@
           <a:p>
             <a:r>
               <a:rPr lang="en-US" dirty="0"/>
-              <a:t>Today’s Material</a:t>
+              <a:t>Class Notes:</a:t>
             </a:r>
           </a:p>
         </p:txBody>
@@ -9221,489 +9222,7 @@
           <p:cNvPr id="3" name="Text Placeholder 2">
             <a:extLst>
               <a:ext uri="{FF2B5EF4-FFF2-40B4-BE49-F238E27FC236}">
-                <a16:creationId xmlns:a16="http://schemas.microsoft.com/office/drawing/2014/main" id="{4EA90F36-A7C9-A34B-B2D2-191179A6F155}"/>
-              </a:ext>
-            </a:extLst>
-          </p:cNvPr>
-          <p:cNvSpPr>
-            <a:spLocks noGrp="1"/>
-          </p:cNvSpPr>
-          <p:nvPr>
-            <p:ph type="body" idx="1"/>
-          </p:nvPr>
-        </p:nvSpPr>
-        <p:spPr/>
-        <p:txBody>
-          <a:bodyPr>
-            <a:normAutofit fontScale="77500" lnSpcReduction="20000"/>
-          </a:bodyPr>
-          <a:lstStyle/>
-          <a:p>
-            <a:pPr marL="114300" indent="0">
-              <a:buNone/>
-            </a:pPr>
-            <a:endParaRPr lang="en-US" dirty="0"/>
-          </a:p>
-          <a:p>
-            <a:r>
-              <a:rPr lang="en-US" dirty="0"/>
-              <a:t>Announcements</a:t>
-            </a:r>
-          </a:p>
-          <a:p>
-            <a:pPr marL="114300" indent="0">
-              <a:buNone/>
-            </a:pPr>
-            <a:endParaRPr lang="en-US" dirty="0"/>
-          </a:p>
-          <a:p>
-            <a:r>
-              <a:rPr lang="en-US" dirty="0"/>
-              <a:t>Some Philosophy</a:t>
-            </a:r>
-          </a:p>
-          <a:p>
-            <a:pPr lvl="1"/>
-            <a:r>
-              <a:rPr lang="en-US" dirty="0"/>
-              <a:t>Definition: a theory or attitude held be a person that acts as a guiding principle</a:t>
-            </a:r>
-          </a:p>
-          <a:p>
-            <a:pPr lvl="1"/>
-            <a:endParaRPr lang="en-US" dirty="0"/>
-          </a:p>
-          <a:p>
-            <a:r>
-              <a:rPr lang="en-US" dirty="0"/>
-              <a:t>Class Notes</a:t>
-            </a:r>
-          </a:p>
-          <a:p>
-            <a:pPr lvl="1"/>
-            <a:r>
-              <a:rPr lang="en-US" dirty="0"/>
-              <a:t>notes_08_26.md</a:t>
-            </a:r>
-          </a:p>
-          <a:p>
-            <a:pPr lvl="1"/>
-            <a:r>
-              <a:rPr lang="en-US" dirty="0"/>
-              <a:t>My notes, but I share!</a:t>
-            </a:r>
-          </a:p>
-          <a:p>
-            <a:pPr lvl="1"/>
-            <a:r>
-              <a:rPr lang="en-US" dirty="0"/>
-              <a:t>I make mistakes – all the time – but I take steps to fix them as identified</a:t>
-            </a:r>
-          </a:p>
-          <a:p>
-            <a:pPr lvl="1"/>
-            <a:r>
-              <a:rPr lang="en-US" dirty="0"/>
-              <a:t>Markdown Viewer</a:t>
-            </a:r>
-          </a:p>
-          <a:p>
-            <a:endParaRPr lang="en-US" dirty="0"/>
-          </a:p>
-          <a:p>
-            <a:r>
-              <a:rPr lang="en-US" dirty="0"/>
-              <a:t>Command Line Interface (CLI) versus a Graphical User Interface (GUI)</a:t>
-            </a:r>
-          </a:p>
-          <a:p>
-            <a:pPr lvl="1"/>
-            <a:r>
-              <a:rPr lang="en-US" dirty="0"/>
-              <a:t>The missing semester: https://</a:t>
-            </a:r>
-            <a:r>
-              <a:rPr lang="en-US" dirty="0" err="1"/>
-              <a:t>missing.csail.mit.edu</a:t>
-            </a:r>
-            <a:r>
-              <a:rPr lang="en-US" dirty="0"/>
-              <a:t>/</a:t>
-            </a:r>
-          </a:p>
-          <a:p>
-            <a:pPr lvl="2"/>
-            <a:r>
-              <a:rPr lang="en-US" dirty="0"/>
-              <a:t>The shell, shell tools and scripting, and the command line environment</a:t>
-            </a:r>
-          </a:p>
-          <a:p>
-            <a:pPr lvl="2"/>
-            <a:r>
-              <a:rPr lang="en-US" dirty="0"/>
-              <a:t>Version Control (git)</a:t>
-            </a:r>
-          </a:p>
-          <a:p>
-            <a:pPr lvl="2"/>
-            <a:r>
-              <a:rPr lang="en-US" dirty="0"/>
-              <a:t>Editors (</a:t>
-            </a:r>
-            <a:r>
-              <a:rPr lang="en-US" dirty="0" err="1"/>
-              <a:t>subl</a:t>
-            </a:r>
-            <a:r>
-              <a:rPr lang="en-US" dirty="0"/>
-              <a:t>) [Sublime Text]</a:t>
-            </a:r>
-          </a:p>
-          <a:p>
-            <a:pPr lvl="1"/>
-            <a:r>
-              <a:rPr lang="en-US" dirty="0"/>
-              <a:t>A comparison between the CLI and the GUI</a:t>
-            </a:r>
-          </a:p>
-          <a:p>
-            <a:pPr lvl="1"/>
-            <a:endParaRPr lang="en-US" dirty="0"/>
-          </a:p>
-        </p:txBody>
-      </p:sp>
-      <p:sp>
-        <p:nvSpPr>
-          <p:cNvPr id="4" name="TextBox 3">
-            <a:extLst>
-              <a:ext uri="{FF2B5EF4-FFF2-40B4-BE49-F238E27FC236}">
-                <a16:creationId xmlns:a16="http://schemas.microsoft.com/office/drawing/2014/main" id="{250BAFE5-6542-944E-ADE5-0A771807A885}"/>
-              </a:ext>
-            </a:extLst>
-          </p:cNvPr>
-          <p:cNvSpPr txBox="1"/>
-          <p:nvPr/>
-        </p:nvSpPr>
-        <p:spPr>
-          <a:xfrm>
-            <a:off x="86711" y="4820308"/>
-            <a:ext cx="3807372" cy="307777"/>
-          </a:xfrm>
-          <a:prstGeom prst="rect">
-            <a:avLst/>
-          </a:prstGeom>
-          <a:noFill/>
-        </p:spPr>
-        <p:txBody>
-          <a:bodyPr wrap="square" rtlCol="0">
-            <a:spAutoFit/>
-          </a:bodyPr>
-          <a:lstStyle/>
-          <a:p>
-            <a:r>
-              <a:rPr lang="en-US" dirty="0"/>
-              <a:t>But let’s go back to the announcements</a:t>
-            </a:r>
-          </a:p>
-        </p:txBody>
-      </p:sp>
-    </p:spTree>
-    <p:extLst>
-      <p:ext uri="{BB962C8B-B14F-4D97-AF65-F5344CB8AC3E}">
-        <p14:creationId xmlns:p14="http://schemas.microsoft.com/office/powerpoint/2010/main" val="2663521613"/>
-      </p:ext>
-    </p:extLst>
-  </p:cSld>
-  <p:clrMapOvr>
-    <a:masterClrMapping/>
-  </p:clrMapOvr>
-</p:sld>
-</file>
-
-<file path=ppt/slides/slide4.xml><?xml version="1.0" encoding="utf-8"?>
-<p:sld xmlns:a="http://schemas.openxmlformats.org/drawingml/2006/main" xmlns:r="http://schemas.openxmlformats.org/officeDocument/2006/relationships" xmlns:p="http://schemas.openxmlformats.org/presentationml/2006/main">
-  <p:cSld>
-    <p:spTree>
-      <p:nvGrpSpPr>
-        <p:cNvPr id="1" name=""/>
-        <p:cNvGrpSpPr/>
-        <p:nvPr/>
-      </p:nvGrpSpPr>
-      <p:grpSpPr>
-        <a:xfrm>
-          <a:off x="0" y="0"/>
-          <a:ext cx="0" cy="0"/>
-          <a:chOff x="0" y="0"/>
-          <a:chExt cx="0" cy="0"/>
-        </a:xfrm>
-      </p:grpSpPr>
-      <p:sp>
-        <p:nvSpPr>
-          <p:cNvPr id="2" name="Title 1">
-            <a:extLst>
-              <a:ext uri="{FF2B5EF4-FFF2-40B4-BE49-F238E27FC236}">
-                <a16:creationId xmlns:a16="http://schemas.microsoft.com/office/drawing/2014/main" id="{C5D64DF0-A960-DE44-864B-94459467C3AC}"/>
-              </a:ext>
-            </a:extLst>
-          </p:cNvPr>
-          <p:cNvSpPr>
-            <a:spLocks noGrp="1"/>
-          </p:cNvSpPr>
-          <p:nvPr>
-            <p:ph type="title"/>
-          </p:nvPr>
-        </p:nvSpPr>
-        <p:spPr/>
-        <p:txBody>
-          <a:bodyPr>
-            <a:normAutofit fontScale="90000"/>
-          </a:bodyPr>
-          <a:lstStyle/>
-          <a:p>
-            <a:r>
-              <a:rPr lang="en-US" dirty="0"/>
-              <a:t>Quick Overview of: Tools and Resources</a:t>
-            </a:r>
-          </a:p>
-        </p:txBody>
-      </p:sp>
-      <p:sp>
-        <p:nvSpPr>
-          <p:cNvPr id="3" name="Text Placeholder 2">
-            <a:extLst>
-              <a:ext uri="{FF2B5EF4-FFF2-40B4-BE49-F238E27FC236}">
-                <a16:creationId xmlns:a16="http://schemas.microsoft.com/office/drawing/2014/main" id="{9E5F9DAC-8673-4845-A053-D9370545B682}"/>
-              </a:ext>
-            </a:extLst>
-          </p:cNvPr>
-          <p:cNvSpPr>
-            <a:spLocks noGrp="1"/>
-          </p:cNvSpPr>
-          <p:nvPr>
-            <p:ph type="body" idx="1"/>
-          </p:nvPr>
-        </p:nvSpPr>
-        <p:spPr/>
-        <p:txBody>
-          <a:bodyPr>
-            <a:normAutofit fontScale="77500" lnSpcReduction="20000"/>
-          </a:bodyPr>
-          <a:lstStyle/>
-          <a:p>
-            <a:r>
-              <a:rPr lang="en-US" dirty="0"/>
-              <a:t>Sublime Text:</a:t>
-            </a:r>
-          </a:p>
-          <a:p>
-            <a:r>
-              <a:rPr lang="en-US" dirty="0"/>
-              <a:t>One Markdown: </a:t>
-            </a:r>
-          </a:p>
-          <a:p>
-            <a:r>
-              <a:rPr lang="en-US" dirty="0"/>
-              <a:t>Lecture Slides: </a:t>
-            </a:r>
-          </a:p>
-          <a:p>
-            <a:pPr lvl="1"/>
-            <a:r>
-              <a:rPr lang="en-US" dirty="0"/>
-              <a:t>“</a:t>
-            </a:r>
-            <a:r>
-              <a:rPr lang="en-US" dirty="0" err="1"/>
-              <a:t>lecture_ordering.md</a:t>
-            </a:r>
-            <a:r>
-              <a:rPr lang="en-US" dirty="0"/>
-              <a:t>”</a:t>
-            </a:r>
-          </a:p>
-          <a:p>
-            <a:pPr lvl="1"/>
-            <a:r>
-              <a:rPr lang="en-US" dirty="0"/>
-              <a:t>“</a:t>
-            </a:r>
-            <a:r>
-              <a:rPr lang="en-US" dirty="0" err="1"/>
-              <a:t>slide_presentations</a:t>
-            </a:r>
-            <a:r>
-              <a:rPr lang="en-US" dirty="0"/>
-              <a:t>/:</a:t>
-            </a:r>
-          </a:p>
-          <a:p>
-            <a:pPr lvl="2"/>
-            <a:r>
-              <a:rPr lang="en-US" dirty="0"/>
-              <a:t>Currently, they are in the .hidden subdirectory</a:t>
-            </a:r>
-          </a:p>
-          <a:p>
-            <a:pPr lvl="2"/>
-            <a:r>
-              <a:rPr lang="en-US" dirty="0"/>
-              <a:t>Ask me why!</a:t>
-            </a:r>
-          </a:p>
-          <a:p>
-            <a:endParaRPr lang="en-US" dirty="0"/>
-          </a:p>
-          <a:p>
-            <a:r>
-              <a:rPr lang="en-US" dirty="0"/>
-              <a:t>Slack: comp122-csun.slack.com</a:t>
-            </a:r>
-          </a:p>
-          <a:p>
-            <a:pPr lvl="1"/>
-            <a:r>
-              <a:rPr lang="en-US" dirty="0"/>
-              <a:t>channel: #fitzgerald-f24</a:t>
-            </a:r>
-          </a:p>
-          <a:p>
-            <a:pPr lvl="1"/>
-            <a:r>
-              <a:rPr lang="en-US" dirty="0"/>
-              <a:t>Pins</a:t>
-            </a:r>
-          </a:p>
-          <a:p>
-            <a:pPr lvl="1"/>
-            <a:r>
-              <a:rPr lang="en-US" dirty="0"/>
-              <a:t>Threads</a:t>
-            </a:r>
-          </a:p>
-          <a:p>
-            <a:pPr lvl="1"/>
-            <a:r>
-              <a:rPr lang="en-US" dirty="0"/>
-              <a:t>Markdown</a:t>
-            </a:r>
-          </a:p>
-          <a:p>
-            <a:pPr lvl="1"/>
-            <a:r>
-              <a:rPr lang="en-US" dirty="0"/>
-              <a:t>Code snippets (i.e., no images.)</a:t>
-            </a:r>
-          </a:p>
-          <a:p>
-            <a:pPr lvl="1"/>
-            <a:endParaRPr lang="en-US" dirty="0"/>
-          </a:p>
-          <a:p>
-            <a:r>
-              <a:rPr lang="en-US" dirty="0"/>
-              <a:t>GitHub Documents:</a:t>
-            </a:r>
-          </a:p>
-          <a:p>
-            <a:pPr lvl="1"/>
-            <a:r>
-              <a:rPr lang="en-US" dirty="0"/>
-              <a:t>https://</a:t>
-            </a:r>
-            <a:r>
-              <a:rPr lang="en-US" dirty="0" err="1"/>
-              <a:t>github.com</a:t>
-            </a:r>
-            <a:r>
-              <a:rPr lang="en-US" dirty="0"/>
-              <a:t>/COMP122</a:t>
-            </a:r>
-          </a:p>
-          <a:p>
-            <a:pPr lvl="1"/>
-            <a:r>
-              <a:rPr lang="en-US" dirty="0"/>
-              <a:t>Invitations URLs: https://</a:t>
-            </a:r>
-            <a:r>
-              <a:rPr lang="en-US" dirty="0" err="1"/>
-              <a:t>classroom.github.com</a:t>
-            </a:r>
-            <a:r>
-              <a:rPr lang="en-US" dirty="0"/>
-              <a:t>/a/c1oXvbim</a:t>
-            </a:r>
-          </a:p>
-        </p:txBody>
-      </p:sp>
-    </p:spTree>
-    <p:extLst>
-      <p:ext uri="{BB962C8B-B14F-4D97-AF65-F5344CB8AC3E}">
-        <p14:creationId xmlns:p14="http://schemas.microsoft.com/office/powerpoint/2010/main" val="3434962752"/>
-      </p:ext>
-    </p:extLst>
-  </p:cSld>
-  <p:clrMapOvr>
-    <a:masterClrMapping/>
-  </p:clrMapOvr>
-</p:sld>
-</file>
-
-<file path=ppt/slides/slide5.xml><?xml version="1.0" encoding="utf-8"?>
-<p:sld xmlns:a="http://schemas.openxmlformats.org/drawingml/2006/main" xmlns:r="http://schemas.openxmlformats.org/officeDocument/2006/relationships" xmlns:p="http://schemas.openxmlformats.org/presentationml/2006/main">
-  <p:cSld>
-    <p:spTree>
-      <p:nvGrpSpPr>
-        <p:cNvPr id="1" name=""/>
-        <p:cNvGrpSpPr/>
-        <p:nvPr/>
-      </p:nvGrpSpPr>
-      <p:grpSpPr>
-        <a:xfrm>
-          <a:off x="0" y="0"/>
-          <a:ext cx="0" cy="0"/>
-          <a:chOff x="0" y="0"/>
-          <a:chExt cx="0" cy="0"/>
-        </a:xfrm>
-      </p:grpSpPr>
-      <p:sp>
-        <p:nvSpPr>
-          <p:cNvPr id="2" name="Title 1">
-            <a:extLst>
-              <a:ext uri="{FF2B5EF4-FFF2-40B4-BE49-F238E27FC236}">
-                <a16:creationId xmlns:a16="http://schemas.microsoft.com/office/drawing/2014/main" id="{B60C46E5-7861-5847-94F1-AB05E7788716}"/>
-              </a:ext>
-            </a:extLst>
-          </p:cNvPr>
-          <p:cNvSpPr>
-            <a:spLocks noGrp="1"/>
-          </p:cNvSpPr>
-          <p:nvPr>
-            <p:ph type="title"/>
-          </p:nvPr>
-        </p:nvSpPr>
-        <p:spPr/>
-        <p:txBody>
-          <a:bodyPr>
-            <a:normAutofit fontScale="90000"/>
-          </a:bodyPr>
-          <a:lstStyle/>
-          <a:p>
-            <a:r>
-              <a:rPr lang="en-US" dirty="0"/>
-              <a:t>Administrivia </a:t>
-            </a:r>
-          </a:p>
-        </p:txBody>
-      </p:sp>
-      <p:sp>
-        <p:nvSpPr>
-          <p:cNvPr id="3" name="Text Placeholder 2">
-            <a:extLst>
-              <a:ext uri="{FF2B5EF4-FFF2-40B4-BE49-F238E27FC236}">
-                <a16:creationId xmlns:a16="http://schemas.microsoft.com/office/drawing/2014/main" id="{F42C5C3C-7DF6-A64A-AA3B-2137B7180CE2}"/>
+                <a16:creationId xmlns:a16="http://schemas.microsoft.com/office/drawing/2014/main" id="{745B1A7C-8E8C-8B42-A533-58A3108496D1}"/>
               </a:ext>
             </a:extLst>
           </p:cNvPr>
@@ -9720,99 +9239,129 @@
           <a:lstStyle/>
           <a:p>
             <a:r>
-              <a:rPr lang="en-US" dirty="0" err="1"/>
-              <a:t>Github</a:t>
-            </a:r>
+              <a:rPr lang="en-US" sz="1800" dirty="0">
+                <a:solidFill>
+                  <a:srgbClr val="565656"/>
+                </a:solidFill>
+                <a:effectLst/>
+                <a:latin typeface="ArialMT"/>
+              </a:rPr>
+              <a:t>Today’s notes:  ~/classes/comp122/administrative/notes_08_28.md </a:t>
+            </a:r>
+          </a:p>
+          <a:p>
+            <a:r>
+              <a:rPr lang="en-US" dirty="0">
+                <a:solidFill>
+                  <a:srgbClr val="565656"/>
+                </a:solidFill>
+                <a:latin typeface="ArialMT"/>
+              </a:rPr>
+              <a:t>These are my notes, but I share!</a:t>
+            </a:r>
+          </a:p>
+          <a:p>
+            <a:r>
+              <a:rPr lang="en-US" sz="1800" dirty="0">
+                <a:solidFill>
+                  <a:srgbClr val="565656"/>
+                </a:solidFill>
+                <a:effectLst/>
+                <a:latin typeface="ArialMT"/>
+              </a:rPr>
+              <a:t>I make mistakes – all the time – but I take steps to fix them</a:t>
+            </a:r>
+          </a:p>
+          <a:p>
+            <a:pPr lvl="1"/>
+            <a:r>
+              <a:rPr lang="en-US" dirty="0">
+                <a:solidFill>
+                  <a:srgbClr val="565656"/>
+                </a:solidFill>
+                <a:latin typeface="ArialMT"/>
+              </a:rPr>
+              <a:t>“</a:t>
+            </a:r>
+            <a:r>
+              <a:rPr lang="en-US" strike="sngStrike" dirty="0">
+                <a:solidFill>
+                  <a:srgbClr val="565656"/>
+                </a:solidFill>
+                <a:latin typeface="ArialMT"/>
+              </a:rPr>
+              <a:t>Perfection</a:t>
+            </a:r>
+            <a:r>
+              <a:rPr lang="en-US" dirty="0">
+                <a:solidFill>
+                  <a:srgbClr val="565656"/>
+                </a:solidFill>
+                <a:latin typeface="ArialMT"/>
+              </a:rPr>
+              <a:t> Continual Improvement is the Goal.”</a:t>
+            </a:r>
+          </a:p>
+          <a:p>
+            <a:pPr lvl="1"/>
+            <a:r>
+              <a:rPr lang="en-US" dirty="0">
+                <a:solidFill>
+                  <a:srgbClr val="565656"/>
+                </a:solidFill>
+                <a:effectLst/>
+                <a:latin typeface="ArialMT"/>
+              </a:rPr>
+              <a:t>“Release Early and Release Often”</a:t>
+            </a:r>
+          </a:p>
+          <a:p>
+            <a:pPr lvl="1"/>
+            <a:r>
+              <a:rPr lang="en-US" dirty="0">
+                <a:solidFill>
+                  <a:srgbClr val="565656"/>
+                </a:solidFill>
+                <a:latin typeface="ArialMT"/>
+              </a:rPr>
+              <a:t>Be Coachable: that is to say “embrace feedback”.</a:t>
+            </a:r>
+            <a:endParaRPr lang="en-US" dirty="0">
+              <a:effectLst/>
+            </a:endParaRPr>
+          </a:p>
+          <a:p>
             <a:r>
               <a:rPr lang="en-US" dirty="0"/>
-              <a:t>: </a:t>
+              <a:t>Use of Markdown</a:t>
             </a:r>
           </a:p>
           <a:p>
             <a:pPr lvl="1"/>
             <a:r>
-              <a:rPr lang="en-US" dirty="0">
-                <a:hlinkClick r:id="rId2"/>
-              </a:rPr>
-              <a:t>https://github.com/COMP122</a:t>
-            </a:r>
-            <a:br>
               <a:rPr lang="en-US" dirty="0"/>
-            </a:br>
-            <a:endParaRPr lang="en-US" dirty="0"/>
-          </a:p>
-          <a:p>
+              <a:t>Why?</a:t>
+            </a:r>
+          </a:p>
+          <a:p>
+            <a:pPr lvl="1"/>
             <a:r>
               <a:rPr lang="en-US" dirty="0"/>
-              <a:t>Class Material Walk Through</a:t>
+              <a:t>Where?</a:t>
             </a:r>
           </a:p>
           <a:p>
             <a:pPr lvl="1"/>
             <a:r>
               <a:rPr lang="en-US" dirty="0"/>
-              <a:t>https://</a:t>
-            </a:r>
-            <a:r>
-              <a:rPr lang="en-US" dirty="0" err="1"/>
-              <a:t>github.com</a:t>
-            </a:r>
+              <a:t>Practice!</a:t>
+            </a:r>
+          </a:p>
+          <a:p>
+            <a:pPr lvl="1"/>
             <a:r>
               <a:rPr lang="en-US" dirty="0"/>
-              <a:t>/COMP122/comp122-f24/blob/main/</a:t>
-            </a:r>
-            <a:r>
-              <a:rPr lang="en-US" dirty="0" err="1"/>
-              <a:t>README.md</a:t>
-            </a:r>
-            <a:endParaRPr lang="en-US" dirty="0"/>
-          </a:p>
-          <a:p>
-            <a:pPr lvl="1"/>
-            <a:r>
-              <a:rPr lang="en-US" dirty="0"/>
-              <a:t>~/comp122/</a:t>
-            </a:r>
-            <a:r>
-              <a:rPr lang="en-US" dirty="0" err="1"/>
-              <a:t>readme.md</a:t>
-            </a:r>
-            <a:br>
-              <a:rPr lang="en-US" dirty="0"/>
-            </a:br>
-            <a:endParaRPr lang="en-US" dirty="0"/>
-          </a:p>
-          <a:p>
-            <a:r>
-              <a:rPr lang="en-US" dirty="0"/>
-              <a:t>Syllabus</a:t>
-            </a:r>
-          </a:p>
-          <a:p>
-            <a:pPr lvl="1"/>
-            <a:r>
-              <a:rPr lang="en-US" dirty="0"/>
-              <a:t>https://</a:t>
-            </a:r>
-            <a:r>
-              <a:rPr lang="en-US" dirty="0" err="1"/>
-              <a:t>github.com</a:t>
-            </a:r>
-            <a:r>
-              <a:rPr lang="en-US" dirty="0"/>
-              <a:t>/COMP122/comp122-f24/blob/main/</a:t>
-            </a:r>
-            <a:r>
-              <a:rPr lang="en-US" dirty="0" err="1"/>
-              <a:t>syllabus.md</a:t>
-            </a:r>
-            <a:endParaRPr lang="en-US" dirty="0"/>
-          </a:p>
-          <a:p>
-            <a:pPr lvl="1"/>
-            <a:r>
-              <a:rPr lang="en-US" dirty="0"/>
-              <a:t>~/comp122/syllabus</a:t>
+              <a:t>Markdown Viewer!</a:t>
             </a:r>
           </a:p>
         </p:txBody>
@@ -9820,7 +9369,7 @@
     </p:spTree>
     <p:extLst>
       <p:ext uri="{BB962C8B-B14F-4D97-AF65-F5344CB8AC3E}">
-        <p14:creationId xmlns:p14="http://schemas.microsoft.com/office/powerpoint/2010/main" val="1491115277"/>
+        <p14:creationId xmlns:p14="http://schemas.microsoft.com/office/powerpoint/2010/main" val="2832196953"/>
       </p:ext>
     </p:extLst>
   </p:cSld>
@@ -9830,7 +9379,7 @@
 </p:sld>
 </file>
 
-<file path=ppt/slides/slide6.xml><?xml version="1.0" encoding="utf-8"?>
+<file path=ppt/slides/slide4.xml><?xml version="1.0" encoding="utf-8"?>
 <p:sld xmlns:a="http://schemas.openxmlformats.org/drawingml/2006/main" xmlns:r="http://schemas.openxmlformats.org/officeDocument/2006/relationships" xmlns:p="http://schemas.openxmlformats.org/presentationml/2006/main">
   <p:cSld>
     <p:spTree>
@@ -9859,7 +9408,7 @@
         </p:nvSpPr>
         <p:spPr>
           <a:xfrm>
-            <a:off x="311700" y="1152475"/>
+            <a:off x="311700" y="979225"/>
             <a:ext cx="8520600" cy="3416400"/>
           </a:xfrm>
           <a:prstGeom prst="rect">
@@ -10251,10 +9800,10 @@
               <a:buNone/>
             </a:pPr>
             <a:r>
-              <a:rPr lang="en"/>
-              <a:t>Languages, Compilers, and Hardware:</a:t>
-            </a:r>
-            <a:endParaRPr/>
+              <a:rPr lang="en-US" dirty="0"/>
+              <a:t>Computer Architecture and Assembly Language</a:t>
+            </a:r>
+            <a:endParaRPr dirty="0"/>
           </a:p>
         </p:txBody>
       </p:sp>
@@ -11357,7 +10906,449 @@
           </a:p>
         </p:txBody>
       </p:sp>
+      <p:sp>
+        <p:nvSpPr>
+          <p:cNvPr id="3" name="TextBox 2">
+            <a:extLst>
+              <a:ext uri="{FF2B5EF4-FFF2-40B4-BE49-F238E27FC236}">
+                <a16:creationId xmlns:a16="http://schemas.microsoft.com/office/drawing/2014/main" id="{E4895422-7C0D-E64E-94F9-8C29F084F152}"/>
+              </a:ext>
+            </a:extLst>
+          </p:cNvPr>
+          <p:cNvSpPr txBox="1"/>
+          <p:nvPr/>
+        </p:nvSpPr>
+        <p:spPr>
+          <a:xfrm>
+            <a:off x="0" y="4835636"/>
+            <a:ext cx="4570482" cy="307777"/>
+          </a:xfrm>
+          <a:prstGeom prst="rect">
+            <a:avLst/>
+          </a:prstGeom>
+          <a:noFill/>
+        </p:spPr>
+        <p:txBody>
+          <a:bodyPr wrap="none" rtlCol="0">
+            <a:spAutoFit/>
+          </a:bodyPr>
+          <a:lstStyle/>
+          <a:p>
+            <a:r>
+              <a:rPr lang="en-US" dirty="0"/>
+              <a:t>In the context of: </a:t>
+            </a:r>
+            <a:r>
+              <a:rPr lang="en" dirty="0"/>
+              <a:t>Languages, Compilers, and Hardware</a:t>
+            </a:r>
+            <a:endParaRPr lang="en-US" dirty="0"/>
+          </a:p>
+        </p:txBody>
+      </p:sp>
     </p:spTree>
+  </p:cSld>
+  <p:clrMapOvr>
+    <a:masterClrMapping/>
+  </p:clrMapOvr>
+</p:sld>
+</file>
+
+<file path=ppt/slides/slide5.xml><?xml version="1.0" encoding="utf-8"?>
+<p:sld xmlns:a="http://schemas.openxmlformats.org/drawingml/2006/main" xmlns:r="http://schemas.openxmlformats.org/officeDocument/2006/relationships" xmlns:p="http://schemas.openxmlformats.org/presentationml/2006/main">
+  <p:cSld>
+    <p:spTree>
+      <p:nvGrpSpPr>
+        <p:cNvPr id="1" name=""/>
+        <p:cNvGrpSpPr/>
+        <p:nvPr/>
+      </p:nvGrpSpPr>
+      <p:grpSpPr>
+        <a:xfrm>
+          <a:off x="0" y="0"/>
+          <a:ext cx="0" cy="0"/>
+          <a:chOff x="0" y="0"/>
+          <a:chExt cx="0" cy="0"/>
+        </a:xfrm>
+      </p:grpSpPr>
+      <p:sp>
+        <p:nvSpPr>
+          <p:cNvPr id="2" name="Title 1">
+            <a:extLst>
+              <a:ext uri="{FF2B5EF4-FFF2-40B4-BE49-F238E27FC236}">
+                <a16:creationId xmlns:a16="http://schemas.microsoft.com/office/drawing/2014/main" id="{77B743EB-8B51-F342-955B-EB8581D6D83E}"/>
+              </a:ext>
+            </a:extLst>
+          </p:cNvPr>
+          <p:cNvSpPr>
+            <a:spLocks noGrp="1"/>
+          </p:cNvSpPr>
+          <p:nvPr>
+            <p:ph type="title"/>
+          </p:nvPr>
+        </p:nvSpPr>
+        <p:spPr/>
+        <p:txBody>
+          <a:bodyPr>
+            <a:normAutofit fontScale="90000"/>
+          </a:bodyPr>
+          <a:lstStyle/>
+          <a:p>
+            <a:r>
+              <a:rPr lang="en-US" dirty="0"/>
+              <a:t>Now What?			          </a:t>
+            </a:r>
+            <a:r>
+              <a:rPr lang="en-US" sz="2000" dirty="0"/>
+              <a:t>(see administrative/notes_08_26.md)</a:t>
+            </a:r>
+            <a:endParaRPr lang="en-US" dirty="0"/>
+          </a:p>
+        </p:txBody>
+      </p:sp>
+      <p:sp>
+        <p:nvSpPr>
+          <p:cNvPr id="3" name="Text Placeholder 2">
+            <a:extLst>
+              <a:ext uri="{FF2B5EF4-FFF2-40B4-BE49-F238E27FC236}">
+                <a16:creationId xmlns:a16="http://schemas.microsoft.com/office/drawing/2014/main" id="{A101A941-86AF-004A-A98B-A2478D92A49A}"/>
+              </a:ext>
+            </a:extLst>
+          </p:cNvPr>
+          <p:cNvSpPr>
+            <a:spLocks noGrp="1"/>
+          </p:cNvSpPr>
+          <p:nvPr>
+            <p:ph type="body" idx="1"/>
+          </p:nvPr>
+        </p:nvSpPr>
+        <p:spPr/>
+        <p:txBody>
+          <a:bodyPr/>
+          <a:lstStyle/>
+          <a:p>
+            <a:r>
+              <a:rPr lang="en-US" dirty="0"/>
+              <a:t>Classroom Management</a:t>
+            </a:r>
+            <a:br>
+              <a:rPr lang="en-US" dirty="0"/>
+            </a:br>
+            <a:endParaRPr lang="en-US" dirty="0"/>
+          </a:p>
+          <a:p>
+            <a:r>
+              <a:rPr lang="en-US" dirty="0"/>
+              <a:t>Purpose of this course</a:t>
+            </a:r>
+          </a:p>
+          <a:p>
+            <a:pPr lvl="1"/>
+            <a:r>
+              <a:rPr lang="en-US" dirty="0"/>
+              <a:t>Not just about assembly language programming nor computer architecture .</a:t>
+            </a:r>
+            <a:br>
+              <a:rPr lang="en-US" dirty="0"/>
+            </a:br>
+            <a:endParaRPr lang="en-US" dirty="0"/>
+          </a:p>
+          <a:p>
+            <a:r>
+              <a:rPr lang="en-US" dirty="0"/>
+              <a:t>Philosophy</a:t>
+            </a:r>
+          </a:p>
+          <a:p>
+            <a:pPr lvl="1"/>
+            <a:r>
+              <a:rPr lang="en-US" dirty="0"/>
+              <a:t>On my emphasis in teaching this class</a:t>
+            </a:r>
+          </a:p>
+          <a:p>
+            <a:pPr marL="596900" lvl="1" indent="0">
+              <a:buNone/>
+            </a:pPr>
+            <a:endParaRPr lang="en-US" dirty="0"/>
+          </a:p>
+        </p:txBody>
+      </p:sp>
+    </p:spTree>
+    <p:extLst>
+      <p:ext uri="{BB962C8B-B14F-4D97-AF65-F5344CB8AC3E}">
+        <p14:creationId xmlns:p14="http://schemas.microsoft.com/office/powerpoint/2010/main" val="2879524084"/>
+      </p:ext>
+    </p:extLst>
+  </p:cSld>
+  <p:clrMapOvr>
+    <a:masterClrMapping/>
+  </p:clrMapOvr>
+</p:sld>
+</file>
+
+<file path=ppt/slides/slide6.xml><?xml version="1.0" encoding="utf-8"?>
+<p:sld xmlns:a="http://schemas.openxmlformats.org/drawingml/2006/main" xmlns:r="http://schemas.openxmlformats.org/officeDocument/2006/relationships" xmlns:p="http://schemas.openxmlformats.org/presentationml/2006/main">
+  <p:cSld>
+    <p:spTree>
+      <p:nvGrpSpPr>
+        <p:cNvPr id="1" name=""/>
+        <p:cNvGrpSpPr/>
+        <p:nvPr/>
+      </p:nvGrpSpPr>
+      <p:grpSpPr>
+        <a:xfrm>
+          <a:off x="0" y="0"/>
+          <a:ext cx="0" cy="0"/>
+          <a:chOff x="0" y="0"/>
+          <a:chExt cx="0" cy="0"/>
+        </a:xfrm>
+      </p:grpSpPr>
+      <p:sp>
+        <p:nvSpPr>
+          <p:cNvPr id="2" name="Title 1">
+            <a:extLst>
+              <a:ext uri="{FF2B5EF4-FFF2-40B4-BE49-F238E27FC236}">
+                <a16:creationId xmlns:a16="http://schemas.microsoft.com/office/drawing/2014/main" id="{C5D64DF0-A960-DE44-864B-94459467C3AC}"/>
+              </a:ext>
+            </a:extLst>
+          </p:cNvPr>
+          <p:cNvSpPr>
+            <a:spLocks noGrp="1"/>
+          </p:cNvSpPr>
+          <p:nvPr>
+            <p:ph type="title"/>
+          </p:nvPr>
+        </p:nvSpPr>
+        <p:spPr/>
+        <p:txBody>
+          <a:bodyPr>
+            <a:normAutofit fontScale="90000"/>
+          </a:bodyPr>
+          <a:lstStyle/>
+          <a:p>
+            <a:r>
+              <a:rPr lang="en-US" dirty="0"/>
+              <a:t>Quick Overview of Tools used in COMP122</a:t>
+            </a:r>
+          </a:p>
+        </p:txBody>
+      </p:sp>
+      <p:sp>
+        <p:nvSpPr>
+          <p:cNvPr id="3" name="Text Placeholder 2">
+            <a:extLst>
+              <a:ext uri="{FF2B5EF4-FFF2-40B4-BE49-F238E27FC236}">
+                <a16:creationId xmlns:a16="http://schemas.microsoft.com/office/drawing/2014/main" id="{9E5F9DAC-8673-4845-A053-D9370545B682}"/>
+              </a:ext>
+            </a:extLst>
+          </p:cNvPr>
+          <p:cNvSpPr>
+            <a:spLocks noGrp="1"/>
+          </p:cNvSpPr>
+          <p:nvPr>
+            <p:ph type="body" idx="1"/>
+          </p:nvPr>
+        </p:nvSpPr>
+        <p:spPr/>
+        <p:txBody>
+          <a:bodyPr>
+            <a:normAutofit fontScale="92500" lnSpcReduction="20000"/>
+          </a:bodyPr>
+          <a:lstStyle/>
+          <a:p>
+            <a:r>
+              <a:rPr lang="en-US" dirty="0"/>
+              <a:t>The missing semester: https://</a:t>
+            </a:r>
+            <a:r>
+              <a:rPr lang="en-US" dirty="0" err="1"/>
+              <a:t>missing.csail.mit.edu</a:t>
+            </a:r>
+            <a:r>
+              <a:rPr lang="en-US" dirty="0"/>
+              <a:t>/</a:t>
+            </a:r>
+          </a:p>
+          <a:p>
+            <a:pPr lvl="1"/>
+            <a:r>
+              <a:rPr lang="en-US" dirty="0"/>
+              <a:t>The shell, shell tools and scripting, and the command line environment</a:t>
+            </a:r>
+          </a:p>
+          <a:p>
+            <a:pPr lvl="1"/>
+            <a:r>
+              <a:rPr lang="en-US" dirty="0"/>
+              <a:t>Editors (</a:t>
+            </a:r>
+            <a:r>
+              <a:rPr lang="en-US" dirty="0" err="1"/>
+              <a:t>subl</a:t>
+            </a:r>
+            <a:r>
+              <a:rPr lang="en-US" dirty="0"/>
+              <a:t>) [Sublime Text]</a:t>
+            </a:r>
+          </a:p>
+          <a:p>
+            <a:pPr lvl="1"/>
+            <a:r>
+              <a:rPr lang="en-US" dirty="0"/>
+              <a:t>Version Control (git)</a:t>
+            </a:r>
+          </a:p>
+          <a:p>
+            <a:r>
+              <a:rPr lang="en-US" dirty="0"/>
+              <a:t>Command Line Interface (CLI) via bash shell</a:t>
+            </a:r>
+          </a:p>
+          <a:p>
+            <a:r>
+              <a:rPr lang="en-US" dirty="0"/>
+              <a:t>Sublime Text</a:t>
+            </a:r>
+          </a:p>
+          <a:p>
+            <a:r>
+              <a:rPr lang="en-US" dirty="0"/>
+              <a:t>One Markdown </a:t>
+            </a:r>
+          </a:p>
+          <a:p>
+            <a:r>
+              <a:rPr lang="en-US" dirty="0"/>
+              <a:t>Git with the GitHub Product:  (</a:t>
+            </a:r>
+            <a:r>
+              <a:rPr lang="en-US" dirty="0">
+                <a:hlinkClick r:id="rId2"/>
+              </a:rPr>
+              <a:t>https://github.com/COMP122</a:t>
+            </a:r>
+            <a:r>
+              <a:rPr lang="en-US" dirty="0"/>
+              <a:t>)</a:t>
+            </a:r>
+          </a:p>
+          <a:p>
+            <a:r>
+              <a:rPr lang="en-US" dirty="0"/>
+              <a:t>Make</a:t>
+            </a:r>
+          </a:p>
+          <a:p>
+            <a:pPr marL="114300" indent="0">
+              <a:buNone/>
+            </a:pPr>
+            <a:endParaRPr lang="en-US" dirty="0"/>
+          </a:p>
+          <a:p>
+            <a:r>
+              <a:rPr lang="en-US" dirty="0"/>
+              <a:t>STH (simple testing harness): (</a:t>
+            </a:r>
+            <a:r>
+              <a:rPr lang="en-US" dirty="0">
+                <a:hlinkClick r:id="rId3"/>
+              </a:rPr>
+              <a:t>https://github.com/smf-steve/sth</a:t>
+            </a:r>
+            <a:r>
+              <a:rPr lang="en-US" dirty="0"/>
+              <a:t>)</a:t>
+            </a:r>
+          </a:p>
+          <a:p>
+            <a:r>
+              <a:rPr lang="en-US" dirty="0"/>
+              <a:t>MARS: (</a:t>
+            </a:r>
+            <a:r>
+              <a:rPr lang="en-US" dirty="0">
+                <a:hlinkClick r:id="rId4"/>
+              </a:rPr>
+              <a:t>http://courses.missouristate.edu/KenVollmar/MARS/index.htm</a:t>
+            </a:r>
+            <a:r>
+              <a:rPr lang="en-US" dirty="0"/>
+              <a:t>)</a:t>
+            </a:r>
+          </a:p>
+          <a:p>
+            <a:r>
+              <a:rPr lang="en-US" dirty="0" err="1"/>
+              <a:t>mips_subroutine</a:t>
+            </a:r>
+            <a:r>
+              <a:rPr lang="en-US" dirty="0"/>
+              <a:t>: </a:t>
+            </a:r>
+            <a:r>
+              <a:rPr lang="en-US" dirty="0">
+                <a:hlinkClick r:id="rId5"/>
+              </a:rPr>
+              <a:t>https://github.com/smf-steve/mips_subroutine</a:t>
+            </a:r>
+            <a:endParaRPr lang="en-US" dirty="0"/>
+          </a:p>
+          <a:p>
+            <a:pPr marL="114300" indent="0">
+              <a:buNone/>
+            </a:pPr>
+            <a:endParaRPr lang="en-US" dirty="0"/>
+          </a:p>
+          <a:p>
+            <a:endParaRPr lang="en-US" dirty="0"/>
+          </a:p>
+        </p:txBody>
+      </p:sp>
+      <p:cxnSp>
+        <p:nvCxnSpPr>
+          <p:cNvPr id="5" name="Straight Connector 4">
+            <a:extLst>
+              <a:ext uri="{FF2B5EF4-FFF2-40B4-BE49-F238E27FC236}">
+                <a16:creationId xmlns:a16="http://schemas.microsoft.com/office/drawing/2014/main" id="{EAD10D5E-B7EB-074E-86AB-5A1592394E9F}"/>
+              </a:ext>
+            </a:extLst>
+          </p:cNvPr>
+          <p:cNvCxnSpPr>
+            <a:cxnSpLocks/>
+          </p:cNvCxnSpPr>
+          <p:nvPr/>
+        </p:nvCxnSpPr>
+        <p:spPr>
+          <a:xfrm>
+            <a:off x="585763" y="3421786"/>
+            <a:ext cx="8202101" cy="0"/>
+          </a:xfrm>
+          <a:prstGeom prst="line">
+            <a:avLst/>
+          </a:prstGeom>
+        </p:spPr>
+        <p:style>
+          <a:lnRef idx="1">
+            <a:schemeClr val="accent1"/>
+          </a:lnRef>
+          <a:fillRef idx="0">
+            <a:schemeClr val="accent1"/>
+          </a:fillRef>
+          <a:effectRef idx="0">
+            <a:schemeClr val="accent1"/>
+          </a:effectRef>
+          <a:fontRef idx="minor">
+            <a:schemeClr val="tx1"/>
+          </a:fontRef>
+        </p:style>
+      </p:cxnSp>
+    </p:spTree>
+    <p:extLst>
+      <p:ext uri="{BB962C8B-B14F-4D97-AF65-F5344CB8AC3E}">
+        <p14:creationId xmlns:p14="http://schemas.microsoft.com/office/powerpoint/2010/main" val="3434962752"/>
+      </p:ext>
+    </p:extLst>
   </p:cSld>
   <p:clrMapOvr>
     <a:masterClrMapping/>
@@ -11387,7 +11378,7 @@
           <p:cNvPr id="2" name="Title 1">
             <a:extLst>
               <a:ext uri="{FF2B5EF4-FFF2-40B4-BE49-F238E27FC236}">
-                <a16:creationId xmlns:a16="http://schemas.microsoft.com/office/drawing/2014/main" id="{29B63A83-ACF3-9548-858D-0583CE17FE7C}"/>
+                <a16:creationId xmlns:a16="http://schemas.microsoft.com/office/drawing/2014/main" id="{89775AD6-FE9F-9B4C-ADE6-FE3C1A5E0D61}"/>
               </a:ext>
             </a:extLst>
           </p:cNvPr>
@@ -11407,7 +11398,15 @@
           <a:p>
             <a:r>
               <a:rPr lang="en-US" dirty="0"/>
-              <a:t>Lab: Walk through:</a:t>
+              <a:t>Slack: https://</a:t>
+            </a:r>
+            <a:r>
+              <a:rPr lang="en-US" dirty="0" err="1"/>
+              <a:t>slack.com</a:t>
+            </a:r>
+            <a:r>
+              <a:rPr lang="en-US" dirty="0"/>
+              <a:t> </a:t>
             </a:r>
           </a:p>
         </p:txBody>
@@ -11417,7 +11416,7 @@
           <p:cNvPr id="3" name="Text Placeholder 2">
             <a:extLst>
               <a:ext uri="{FF2B5EF4-FFF2-40B4-BE49-F238E27FC236}">
-                <a16:creationId xmlns:a16="http://schemas.microsoft.com/office/drawing/2014/main" id="{A13971E0-0577-D646-9419-724CEA3A9F04}"/>
+                <a16:creationId xmlns:a16="http://schemas.microsoft.com/office/drawing/2014/main" id="{64728C0A-5DAF-CA4C-9C8F-F6F302C40BCE}"/>
               </a:ext>
             </a:extLst>
           </p:cNvPr>
@@ -11430,23 +11429,20 @@
         </p:nvSpPr>
         <p:spPr/>
         <p:txBody>
-          <a:bodyPr/>
+          <a:bodyPr>
+            <a:normAutofit fontScale="85000" lnSpcReduction="20000"/>
+          </a:bodyPr>
           <a:lstStyle/>
           <a:p>
             <a:r>
               <a:rPr lang="en-US" dirty="0"/>
-              <a:t>Laptop Setup:</a:t>
-            </a:r>
-          </a:p>
-          <a:p>
-            <a:pPr lvl="1"/>
+              <a:t>General Description:</a:t>
+            </a:r>
+          </a:p>
+          <a:p>
             <a:r>
               <a:rPr lang="en-US" dirty="0"/>
-              <a:t>~/comp122/</a:t>
-            </a:r>
-            <a:r>
-              <a:rPr lang="en-US" dirty="0" err="1"/>
-              <a:t>setup.md</a:t>
+              <a:t>Purpose: Our primary off-line communication tool.</a:t>
             </a:r>
             <a:br>
               <a:rPr lang="en-US" dirty="0"/>
@@ -11455,6 +11451,254 @@
           </a:p>
           <a:p>
             <a:r>
+              <a:rPr lang="en-US" dirty="0"/>
+              <a:t>Team: comp122-csun.slack.com</a:t>
+            </a:r>
+          </a:p>
+          <a:p>
+            <a:r>
+              <a:rPr lang="en-US" dirty="0"/>
+              <a:t>Channel: #fitzgerald-f24</a:t>
+            </a:r>
+            <a:br>
+              <a:rPr lang="en-US" dirty="0"/>
+            </a:br>
+            <a:endParaRPr lang="en-US" dirty="0"/>
+          </a:p>
+          <a:p>
+            <a:r>
+              <a:rPr lang="en-US" dirty="0"/>
+              <a:t>Walk Through and Usage:</a:t>
+            </a:r>
+          </a:p>
+          <a:p>
+            <a:pPr lvl="1"/>
+            <a:r>
+              <a:rPr lang="en-US" dirty="0"/>
+              <a:t>Review previous messages before posting a new message</a:t>
+            </a:r>
+          </a:p>
+          <a:p>
+            <a:pPr lvl="1"/>
+            <a:r>
+              <a:rPr lang="en-US" dirty="0"/>
+              <a:t>Create a </a:t>
+            </a:r>
+            <a:r>
+              <a:rPr lang="en-US" b="1" dirty="0"/>
+              <a:t>Thread</a:t>
+            </a:r>
+            <a:r>
+              <a:rPr lang="en-US" dirty="0"/>
+              <a:t> for each topic/issue</a:t>
+            </a:r>
+          </a:p>
+          <a:p>
+            <a:pPr lvl="1"/>
+            <a:r>
+              <a:rPr lang="en-US" dirty="0"/>
+              <a:t>Create Actionable messages verses ”Thanks for sharing” messages</a:t>
+            </a:r>
+          </a:p>
+          <a:p>
+            <a:pPr lvl="1"/>
+            <a:r>
+              <a:rPr lang="en-US" dirty="0"/>
+              <a:t>Write a message from the point of view of the receiver!</a:t>
+            </a:r>
+          </a:p>
+          <a:p>
+            <a:pPr lvl="1"/>
+            <a:r>
+              <a:rPr lang="en-US" dirty="0"/>
+              <a:t>Images versus </a:t>
+            </a:r>
+            <a:r>
+              <a:rPr lang="en-US" b="1" dirty="0"/>
+              <a:t>Text Snippets</a:t>
+            </a:r>
+          </a:p>
+          <a:p>
+            <a:pPr lvl="1"/>
+            <a:r>
+              <a:rPr lang="en-US" sz="1500" dirty="0"/>
+              <a:t>Pin</a:t>
+            </a:r>
+            <a:r>
+              <a:rPr lang="en-US" dirty="0"/>
+              <a:t> important information</a:t>
+            </a:r>
+          </a:p>
+          <a:p>
+            <a:pPr lvl="1"/>
+            <a:r>
+              <a:rPr lang="en-US" sz="1500" dirty="0"/>
+              <a:t>Edit</a:t>
+            </a:r>
+            <a:r>
+              <a:rPr lang="en-US" dirty="0"/>
+              <a:t> messages (we all make mistakes… but fix them.)</a:t>
+            </a:r>
+          </a:p>
+          <a:p>
+            <a:pPr lvl="1"/>
+            <a:r>
+              <a:rPr lang="en-US" dirty="0"/>
+              <a:t>Markdown</a:t>
+            </a:r>
+          </a:p>
+          <a:p>
+            <a:pPr lvl="1"/>
+            <a:endParaRPr lang="en-US" dirty="0"/>
+          </a:p>
+        </p:txBody>
+      </p:sp>
+    </p:spTree>
+    <p:extLst>
+      <p:ext uri="{BB962C8B-B14F-4D97-AF65-F5344CB8AC3E}">
+        <p14:creationId xmlns:p14="http://schemas.microsoft.com/office/powerpoint/2010/main" val="1358392532"/>
+      </p:ext>
+    </p:extLst>
+  </p:cSld>
+  <p:clrMapOvr>
+    <a:masterClrMapping/>
+  </p:clrMapOvr>
+</p:sld>
+</file>
+
+<file path=ppt/slides/slide8.xml><?xml version="1.0" encoding="utf-8"?>
+<p:sld xmlns:a="http://schemas.openxmlformats.org/drawingml/2006/main" xmlns:r="http://schemas.openxmlformats.org/officeDocument/2006/relationships" xmlns:p="http://schemas.openxmlformats.org/presentationml/2006/main">
+  <p:cSld>
+    <p:spTree>
+      <p:nvGrpSpPr>
+        <p:cNvPr id="1" name=""/>
+        <p:cNvGrpSpPr/>
+        <p:nvPr/>
+      </p:nvGrpSpPr>
+      <p:grpSpPr>
+        <a:xfrm>
+          <a:off x="0" y="0"/>
+          <a:ext cx="0" cy="0"/>
+          <a:chOff x="0" y="0"/>
+          <a:chExt cx="0" cy="0"/>
+        </a:xfrm>
+      </p:grpSpPr>
+      <p:sp>
+        <p:nvSpPr>
+          <p:cNvPr id="2" name="Title 1">
+            <a:extLst>
+              <a:ext uri="{FF2B5EF4-FFF2-40B4-BE49-F238E27FC236}">
+                <a16:creationId xmlns:a16="http://schemas.microsoft.com/office/drawing/2014/main" id="{B60C46E5-7861-5847-94F1-AB05E7788716}"/>
+              </a:ext>
+            </a:extLst>
+          </p:cNvPr>
+          <p:cNvSpPr>
+            <a:spLocks noGrp="1"/>
+          </p:cNvSpPr>
+          <p:nvPr>
+            <p:ph type="title"/>
+          </p:nvPr>
+        </p:nvSpPr>
+        <p:spPr/>
+        <p:txBody>
+          <a:bodyPr>
+            <a:normAutofit fontScale="90000"/>
+          </a:bodyPr>
+          <a:lstStyle/>
+          <a:p>
+            <a:r>
+              <a:rPr lang="en-US" dirty="0"/>
+              <a:t>Administrivia </a:t>
+            </a:r>
+          </a:p>
+        </p:txBody>
+      </p:sp>
+      <p:sp>
+        <p:nvSpPr>
+          <p:cNvPr id="3" name="Text Placeholder 2">
+            <a:extLst>
+              <a:ext uri="{FF2B5EF4-FFF2-40B4-BE49-F238E27FC236}">
+                <a16:creationId xmlns:a16="http://schemas.microsoft.com/office/drawing/2014/main" id="{F42C5C3C-7DF6-A64A-AA3B-2137B7180CE2}"/>
+              </a:ext>
+            </a:extLst>
+          </p:cNvPr>
+          <p:cNvSpPr>
+            <a:spLocks noGrp="1"/>
+          </p:cNvSpPr>
+          <p:nvPr>
+            <p:ph type="body" idx="1"/>
+          </p:nvPr>
+        </p:nvSpPr>
+        <p:spPr/>
+        <p:txBody>
+          <a:bodyPr>
+            <a:normAutofit fontScale="92500" lnSpcReduction="10000"/>
+          </a:bodyPr>
+          <a:lstStyle/>
+          <a:p>
+            <a:r>
+              <a:rPr lang="en-US" dirty="0"/>
+              <a:t>Syllabus and Class Material</a:t>
+            </a:r>
+          </a:p>
+          <a:p>
+            <a:pPr lvl="1"/>
+            <a:r>
+              <a:rPr lang="en-US" dirty="0">
+                <a:hlinkClick r:id="rId2"/>
+              </a:rPr>
+              <a:t>https://github.com/COMP122/comp122-f24/blob/main/syllabus.md</a:t>
+            </a:r>
+            <a:endParaRPr lang="en-US" dirty="0"/>
+          </a:p>
+          <a:p>
+            <a:pPr lvl="1"/>
+            <a:r>
+              <a:rPr lang="en-US" dirty="0"/>
+              <a:t>~/classes/comp122/</a:t>
+            </a:r>
+            <a:r>
+              <a:rPr lang="en-US" dirty="0" err="1"/>
+              <a:t>syllabus.md</a:t>
+            </a:r>
+            <a:endParaRPr lang="en-US" dirty="0"/>
+          </a:p>
+          <a:p>
+            <a:endParaRPr lang="en-US" dirty="0"/>
+          </a:p>
+          <a:p>
+            <a:r>
+              <a:rPr lang="en-US" dirty="0"/>
+              <a:t> The Setup Process (i.e., Assignment #1)</a:t>
+            </a:r>
+          </a:p>
+          <a:p>
+            <a:pPr lvl="1"/>
+            <a:r>
+              <a:rPr lang="en-US" dirty="0">
+                <a:hlinkClick r:id="rId3"/>
+              </a:rPr>
+              <a:t>https://github.com/COMP122/comp122-f24/blob/main/setup.md</a:t>
+            </a:r>
+            <a:endParaRPr lang="en-US" dirty="0"/>
+          </a:p>
+          <a:p>
+            <a:pPr lvl="1"/>
+            <a:r>
+              <a:rPr lang="en-US" dirty="0"/>
+              <a:t>~/classes/comp122/</a:t>
+            </a:r>
+            <a:r>
+              <a:rPr lang="en-US" dirty="0" err="1"/>
+              <a:t>setup.md</a:t>
+            </a:r>
+            <a:br>
+              <a:rPr lang="en-US" dirty="0"/>
+            </a:br>
+            <a:endParaRPr lang="en-US" dirty="0"/>
+          </a:p>
+          <a:p>
+            <a:r>
               <a:rPr lang="en-US" b="0" i="0" u="none" strike="noStrike" dirty="0">
                 <a:solidFill>
                   <a:srgbClr val="4B4F58"/>
@@ -11469,12 +11713,22 @@
             <a:pPr lvl="1"/>
             <a:r>
               <a:rPr lang="en-US" dirty="0">
+                <a:hlinkClick r:id="rId4"/>
+              </a:rPr>
+              <a:t>https://github.com/COMP122/comp122-f24/blob/main/assignments.md</a:t>
+            </a:r>
+            <a:endParaRPr lang="en-US" dirty="0"/>
+          </a:p>
+          <a:p>
+            <a:pPr lvl="1"/>
+            <a:r>
+              <a:rPr lang="en-US" dirty="0">
                 <a:solidFill>
                   <a:srgbClr val="4B4F58"/>
                 </a:solidFill>
                 <a:latin typeface="Helvetica" pitchFamily="2" charset="0"/>
               </a:rPr>
-              <a:t>~/comp122/deliverables/</a:t>
+              <a:t>~/classes/comp122/deliverables/</a:t>
             </a:r>
             <a:r>
               <a:rPr lang="en-US" dirty="0" err="1">
@@ -11501,7 +11755,7 @@
                 </a:solidFill>
                 <a:latin typeface="Helvetica" pitchFamily="2" charset="0"/>
               </a:rPr>
-              <a:t>Assignment #1:</a:t>
+              <a:t>Assignment #2:</a:t>
             </a:r>
           </a:p>
           <a:p>
@@ -11517,7 +11771,7 @@
                 </a:solidFill>
                 <a:latin typeface="Helvetica" pitchFamily="2" charset="0"/>
               </a:rPr>
-              <a:t>~/comp122/deliverables/</a:t>
+              <a:t>~/classes/comp122/deliverables/</a:t>
             </a:r>
             <a:r>
               <a:rPr lang="en-US" dirty="0" err="1">
@@ -11526,39 +11780,19 @@
                 </a:solidFill>
                 <a:latin typeface="Helvetica" pitchFamily="2" charset="0"/>
               </a:rPr>
-              <a:t>assignments</a:t>
-            </a:r>
-            <a:r>
-              <a:rPr lang="en-US" err="1">
-                <a:solidFill>
-                  <a:srgbClr val="4B4F58"/>
-                </a:solidFill>
-                <a:latin typeface="Helvetica" pitchFamily="2" charset="0"/>
-              </a:rPr>
-              <a:t>.</a:t>
-            </a:r>
-            <a:r>
-              <a:rPr lang="en-US">
-                <a:solidFill>
-                  <a:srgbClr val="4B4F58"/>
-                </a:solidFill>
-                <a:latin typeface="Helvetica" pitchFamily="2" charset="0"/>
-              </a:rPr>
-              <a:t>md</a:t>
-            </a:r>
-            <a:endParaRPr lang="en-US" dirty="0">
-              <a:solidFill>
-                <a:srgbClr val="4B4F58"/>
-              </a:solidFill>
-              <a:latin typeface="Helvetica" pitchFamily="2" charset="0"/>
-            </a:endParaRPr>
+              <a:t>assignments.md</a:t>
+            </a:r>
+            <a:br>
+              <a:rPr lang="en-US" dirty="0"/>
+            </a:br>
+            <a:endParaRPr lang="en-US" dirty="0"/>
           </a:p>
         </p:txBody>
       </p:sp>
     </p:spTree>
     <p:extLst>
       <p:ext uri="{BB962C8B-B14F-4D97-AF65-F5344CB8AC3E}">
-        <p14:creationId xmlns:p14="http://schemas.microsoft.com/office/powerpoint/2010/main" val="1416212345"/>
+        <p14:creationId xmlns:p14="http://schemas.microsoft.com/office/powerpoint/2010/main" val="1491115277"/>
       </p:ext>
     </p:extLst>
   </p:cSld>

</xml_diff>